<commit_message>
Uploading presentation slides with minor update in Weekly_Meeting_210507.pptx
</commit_message>
<xml_diff>
--- a/Faysal/Weekly_Meeting_210507.pptx
+++ b/Faysal/Weekly_Meeting_210507.pptx
@@ -130,7 +130,7 @@
 <file path=ppt/revisionInfo.xml><?xml version="1.0" encoding="utf-8"?>
 <p1510:revInfo xmlns:a="http://schemas.openxmlformats.org/drawingml/2006/main" xmlns:r="http://schemas.openxmlformats.org/officeDocument/2006/relationships" xmlns:p1510="http://schemas.microsoft.com/office/powerpoint/2015/10/main">
   <p1510:revLst>
-    <p1510:client id="{7D08CCF5-22C4-48DA-9D9F-37A90B395005}" v="21" dt="2021-05-07T16:56:17.349"/>
+    <p1510:client id="{7D08CCF5-22C4-48DA-9D9F-37A90B395005}" v="32" dt="2021-06-15T18:20:23.769"/>
   </p1510:revLst>
 </p1510:revInfo>
 </file>
@@ -815,7 +815,7 @@
   <pc:docChgLst>
     <pc:chgData name="Md Kauser Ahmmed" userId="81e39d19-8d5c-4ffe-9a82-20799efac8e0" providerId="ADAL" clId="{7D08CCF5-22C4-48DA-9D9F-37A90B395005}"/>
     <pc:docChg chg="undo custSel addSld delSld modSld">
-      <pc:chgData name="Md Kauser Ahmmed" userId="81e39d19-8d5c-4ffe-9a82-20799efac8e0" providerId="ADAL" clId="{7D08CCF5-22C4-48DA-9D9F-37A90B395005}" dt="2021-05-07T16:56:56.538" v="854" actId="47"/>
+      <pc:chgData name="Md Kauser Ahmmed" userId="81e39d19-8d5c-4ffe-9a82-20799efac8e0" providerId="ADAL" clId="{7D08CCF5-22C4-48DA-9D9F-37A90B395005}" dt="2021-06-15T18:20:26.249" v="936" actId="26606"/>
       <pc:docMkLst>
         <pc:docMk/>
       </pc:docMkLst>
@@ -857,13 +857,13 @@
         </pc:spChg>
       </pc:sldChg>
       <pc:sldChg chg="addSp delSp modSp new mod setBg">
-        <pc:chgData name="Md Kauser Ahmmed" userId="81e39d19-8d5c-4ffe-9a82-20799efac8e0" providerId="ADAL" clId="{7D08CCF5-22C4-48DA-9D9F-37A90B395005}" dt="2021-05-07T16:47:56.127" v="411" actId="20577"/>
+        <pc:chgData name="Md Kauser Ahmmed" userId="81e39d19-8d5c-4ffe-9a82-20799efac8e0" providerId="ADAL" clId="{7D08CCF5-22C4-48DA-9D9F-37A90B395005}" dt="2021-06-15T18:05:42.404" v="889" actId="26606"/>
         <pc:sldMkLst>
           <pc:docMk/>
           <pc:sldMk cId="2554373544" sldId="315"/>
         </pc:sldMkLst>
         <pc:spChg chg="mod">
-          <ac:chgData name="Md Kauser Ahmmed" userId="81e39d19-8d5c-4ffe-9a82-20799efac8e0" providerId="ADAL" clId="{7D08CCF5-22C4-48DA-9D9F-37A90B395005}" dt="2021-05-07T16:47:56.127" v="411" actId="20577"/>
+          <ac:chgData name="Md Kauser Ahmmed" userId="81e39d19-8d5c-4ffe-9a82-20799efac8e0" providerId="ADAL" clId="{7D08CCF5-22C4-48DA-9D9F-37A90B395005}" dt="2021-06-15T18:04:06.259" v="868" actId="20577"/>
           <ac:spMkLst>
             <pc:docMk/>
             <pc:sldMk cId="2554373544" sldId="315"/>
@@ -878,16 +878,40 @@
             <ac:spMk id="3" creationId="{27A09FFD-16B5-41AE-A8D0-E08A9158303D}"/>
           </ac:spMkLst>
         </pc:spChg>
-        <pc:spChg chg="add">
-          <ac:chgData name="Md Kauser Ahmmed" userId="81e39d19-8d5c-4ffe-9a82-20799efac8e0" providerId="ADAL" clId="{7D08CCF5-22C4-48DA-9D9F-37A90B395005}" dt="2021-05-07T16:44:38.525" v="264" actId="26606"/>
+        <pc:spChg chg="add del mod">
+          <ac:chgData name="Md Kauser Ahmmed" userId="81e39d19-8d5c-4ffe-9a82-20799efac8e0" providerId="ADAL" clId="{7D08CCF5-22C4-48DA-9D9F-37A90B395005}" dt="2021-06-15T18:05:30.603" v="884" actId="931"/>
+          <ac:spMkLst>
+            <pc:docMk/>
+            <pc:sldMk cId="2554373544" sldId="315"/>
+            <ac:spMk id="4" creationId="{FB694CD6-2B05-4675-B85A-62D340AA8607}"/>
+          </ac:spMkLst>
+        </pc:spChg>
+        <pc:spChg chg="add del">
+          <ac:chgData name="Md Kauser Ahmmed" userId="81e39d19-8d5c-4ffe-9a82-20799efac8e0" providerId="ADAL" clId="{7D08CCF5-22C4-48DA-9D9F-37A90B395005}" dt="2021-06-15T18:05:42.404" v="889" actId="26606"/>
           <ac:spMkLst>
             <pc:docMk/>
             <pc:sldMk cId="2554373544" sldId="315"/>
             <ac:spMk id="10" creationId="{A4AC5506-6312-4701-8D3C-40187889A947}"/>
           </ac:spMkLst>
         </pc:spChg>
-        <pc:picChg chg="add mod">
-          <ac:chgData name="Md Kauser Ahmmed" userId="81e39d19-8d5c-4ffe-9a82-20799efac8e0" providerId="ADAL" clId="{7D08CCF5-22C4-48DA-9D9F-37A90B395005}" dt="2021-05-07T16:46:49.714" v="340" actId="14100"/>
+        <pc:spChg chg="add">
+          <ac:chgData name="Md Kauser Ahmmed" userId="81e39d19-8d5c-4ffe-9a82-20799efac8e0" providerId="ADAL" clId="{7D08CCF5-22C4-48DA-9D9F-37A90B395005}" dt="2021-06-15T18:05:42.404" v="889" actId="26606"/>
+          <ac:spMkLst>
+            <pc:docMk/>
+            <pc:sldMk cId="2554373544" sldId="315"/>
+            <ac:spMk id="12" creationId="{A4AC5506-6312-4701-8D3C-40187889A947}"/>
+          </ac:spMkLst>
+        </pc:spChg>
+        <pc:spChg chg="add del">
+          <ac:chgData name="Md Kauser Ahmmed" userId="81e39d19-8d5c-4ffe-9a82-20799efac8e0" providerId="ADAL" clId="{7D08CCF5-22C4-48DA-9D9F-37A90B395005}" dt="2021-06-15T18:05:40.450" v="888" actId="26606"/>
+          <ac:spMkLst>
+            <pc:docMk/>
+            <pc:sldMk cId="2554373544" sldId="315"/>
+            <ac:spMk id="15" creationId="{A4AC5506-6312-4701-8D3C-40187889A947}"/>
+          </ac:spMkLst>
+        </pc:spChg>
+        <pc:picChg chg="add del mod">
+          <ac:chgData name="Md Kauser Ahmmed" userId="81e39d19-8d5c-4ffe-9a82-20799efac8e0" providerId="ADAL" clId="{7D08CCF5-22C4-48DA-9D9F-37A90B395005}" dt="2021-06-15T18:04:55.332" v="883" actId="478"/>
           <ac:picMkLst>
             <pc:docMk/>
             <pc:sldMk cId="2554373544" sldId="315"/>
@@ -900,6 +924,14 @@
             <pc:docMk/>
             <pc:sldMk cId="2554373544" sldId="315"/>
             <ac:picMk id="7" creationId="{02AF2B68-E7FE-4130-B182-948E6E5BA779}"/>
+          </ac:picMkLst>
+        </pc:picChg>
+        <pc:picChg chg="add mod">
+          <ac:chgData name="Md Kauser Ahmmed" userId="81e39d19-8d5c-4ffe-9a82-20799efac8e0" providerId="ADAL" clId="{7D08CCF5-22C4-48DA-9D9F-37A90B395005}" dt="2021-06-15T18:05:42.404" v="889" actId="26606"/>
+          <ac:picMkLst>
+            <pc:docMk/>
+            <pc:sldMk cId="2554373544" sldId="315"/>
+            <ac:picMk id="7" creationId="{5896545A-6956-4BD6-B8D4-89EC625CF3BF}"/>
           </ac:picMkLst>
         </pc:picChg>
       </pc:sldChg>
@@ -918,7 +950,7 @@
         </pc:sldMkLst>
       </pc:sldChg>
       <pc:sldChg chg="addSp delSp modSp new mod setBg">
-        <pc:chgData name="Md Kauser Ahmmed" userId="81e39d19-8d5c-4ffe-9a82-20799efac8e0" providerId="ADAL" clId="{7D08CCF5-22C4-48DA-9D9F-37A90B395005}" dt="2021-05-07T16:48:02.487" v="424" actId="20577"/>
+        <pc:chgData name="Md Kauser Ahmmed" userId="81e39d19-8d5c-4ffe-9a82-20799efac8e0" providerId="ADAL" clId="{7D08CCF5-22C4-48DA-9D9F-37A90B395005}" dt="2021-06-15T18:06:11.459" v="894" actId="26606"/>
         <pc:sldMkLst>
           <pc:docMk/>
           <pc:sldMk cId="742002924" sldId="316"/>
@@ -939,31 +971,55 @@
             <ac:spMk id="3" creationId="{DBBC7E64-5140-46BC-AF78-7495B299EEFE}"/>
           </ac:spMkLst>
         </pc:spChg>
-        <pc:spChg chg="add">
-          <ac:chgData name="Md Kauser Ahmmed" userId="81e39d19-8d5c-4ffe-9a82-20799efac8e0" providerId="ADAL" clId="{7D08CCF5-22C4-48DA-9D9F-37A90B395005}" dt="2021-05-07T16:45:27.375" v="326" actId="26606"/>
+        <pc:spChg chg="add del mod">
+          <ac:chgData name="Md Kauser Ahmmed" userId="81e39d19-8d5c-4ffe-9a82-20799efac8e0" providerId="ADAL" clId="{7D08CCF5-22C4-48DA-9D9F-37A90B395005}" dt="2021-06-15T18:06:08.095" v="891" actId="931"/>
+          <ac:spMkLst>
+            <pc:docMk/>
+            <pc:sldMk cId="742002924" sldId="316"/>
+            <ac:spMk id="4" creationId="{A7737E93-BF84-4A96-BF82-592A8681F0FE}"/>
+          </ac:spMkLst>
+        </pc:spChg>
+        <pc:spChg chg="add del">
+          <ac:chgData name="Md Kauser Ahmmed" userId="81e39d19-8d5c-4ffe-9a82-20799efac8e0" providerId="ADAL" clId="{7D08CCF5-22C4-48DA-9D9F-37A90B395005}" dt="2021-06-15T18:06:11.459" v="894" actId="26606"/>
           <ac:spMkLst>
             <pc:docMk/>
             <pc:sldMk cId="742002924" sldId="316"/>
             <ac:spMk id="10" creationId="{A4AC5506-6312-4701-8D3C-40187889A947}"/>
           </ac:spMkLst>
         </pc:spChg>
-        <pc:picChg chg="add mod">
-          <ac:chgData name="Md Kauser Ahmmed" userId="81e39d19-8d5c-4ffe-9a82-20799efac8e0" providerId="ADAL" clId="{7D08CCF5-22C4-48DA-9D9F-37A90B395005}" dt="2021-05-07T16:45:27.375" v="326" actId="26606"/>
+        <pc:spChg chg="add">
+          <ac:chgData name="Md Kauser Ahmmed" userId="81e39d19-8d5c-4ffe-9a82-20799efac8e0" providerId="ADAL" clId="{7D08CCF5-22C4-48DA-9D9F-37A90B395005}" dt="2021-06-15T18:06:11.459" v="894" actId="26606"/>
+          <ac:spMkLst>
+            <pc:docMk/>
+            <pc:sldMk cId="742002924" sldId="316"/>
+            <ac:spMk id="15" creationId="{A4AC5506-6312-4701-8D3C-40187889A947}"/>
+          </ac:spMkLst>
+        </pc:spChg>
+        <pc:picChg chg="add del mod">
+          <ac:chgData name="Md Kauser Ahmmed" userId="81e39d19-8d5c-4ffe-9a82-20799efac8e0" providerId="ADAL" clId="{7D08CCF5-22C4-48DA-9D9F-37A90B395005}" dt="2021-06-15T18:05:58.598" v="890" actId="478"/>
           <ac:picMkLst>
             <pc:docMk/>
             <pc:sldMk cId="742002924" sldId="316"/>
             <ac:picMk id="5" creationId="{5C893EAD-17AC-4FE5-95B6-4C25BD81D608}"/>
           </ac:picMkLst>
         </pc:picChg>
+        <pc:picChg chg="add mod">
+          <ac:chgData name="Md Kauser Ahmmed" userId="81e39d19-8d5c-4ffe-9a82-20799efac8e0" providerId="ADAL" clId="{7D08CCF5-22C4-48DA-9D9F-37A90B395005}" dt="2021-06-15T18:06:11.459" v="894" actId="26606"/>
+          <ac:picMkLst>
+            <pc:docMk/>
+            <pc:sldMk cId="742002924" sldId="316"/>
+            <ac:picMk id="7" creationId="{2F376F99-91F2-46AE-8C07-6720005AF3DD}"/>
+          </ac:picMkLst>
+        </pc:picChg>
       </pc:sldChg>
       <pc:sldChg chg="addSp delSp modSp new mod setBg">
-        <pc:chgData name="Md Kauser Ahmmed" userId="81e39d19-8d5c-4ffe-9a82-20799efac8e0" providerId="ADAL" clId="{7D08CCF5-22C4-48DA-9D9F-37A90B395005}" dt="2021-05-07T16:48:19.571" v="428" actId="26606"/>
+        <pc:chgData name="Md Kauser Ahmmed" userId="81e39d19-8d5c-4ffe-9a82-20799efac8e0" providerId="ADAL" clId="{7D08CCF5-22C4-48DA-9D9F-37A90B395005}" dt="2021-06-15T18:07:34.194" v="899" actId="26606"/>
         <pc:sldMkLst>
           <pc:docMk/>
           <pc:sldMk cId="721824467" sldId="317"/>
         </pc:sldMkLst>
         <pc:spChg chg="mod">
-          <ac:chgData name="Md Kauser Ahmmed" userId="81e39d19-8d5c-4ffe-9a82-20799efac8e0" providerId="ADAL" clId="{7D08CCF5-22C4-48DA-9D9F-37A90B395005}" dt="2021-05-07T16:48:19.571" v="428" actId="26606"/>
+          <ac:chgData name="Md Kauser Ahmmed" userId="81e39d19-8d5c-4ffe-9a82-20799efac8e0" providerId="ADAL" clId="{7D08CCF5-22C4-48DA-9D9F-37A90B395005}" dt="2021-06-15T18:04:20.719" v="882" actId="20577"/>
           <ac:spMkLst>
             <pc:docMk/>
             <pc:sldMk cId="721824467" sldId="317"/>
@@ -978,20 +1034,44 @@
             <ac:spMk id="3" creationId="{5F8A0A2B-8842-4CF1-B456-C9554AD95CFC}"/>
           </ac:spMkLst>
         </pc:spChg>
-        <pc:spChg chg="add">
-          <ac:chgData name="Md Kauser Ahmmed" userId="81e39d19-8d5c-4ffe-9a82-20799efac8e0" providerId="ADAL" clId="{7D08CCF5-22C4-48DA-9D9F-37A90B395005}" dt="2021-05-07T16:48:19.571" v="428" actId="26606"/>
+        <pc:spChg chg="add del mod">
+          <ac:chgData name="Md Kauser Ahmmed" userId="81e39d19-8d5c-4ffe-9a82-20799efac8e0" providerId="ADAL" clId="{7D08CCF5-22C4-48DA-9D9F-37A90B395005}" dt="2021-06-15T18:07:30.774" v="896" actId="931"/>
+          <ac:spMkLst>
+            <pc:docMk/>
+            <pc:sldMk cId="721824467" sldId="317"/>
+            <ac:spMk id="4" creationId="{EC8BF400-36F9-4A64-902F-B92EF09D27BD}"/>
+          </ac:spMkLst>
+        </pc:spChg>
+        <pc:spChg chg="add del">
+          <ac:chgData name="Md Kauser Ahmmed" userId="81e39d19-8d5c-4ffe-9a82-20799efac8e0" providerId="ADAL" clId="{7D08CCF5-22C4-48DA-9D9F-37A90B395005}" dt="2021-06-15T18:07:34.194" v="899" actId="26606"/>
           <ac:spMkLst>
             <pc:docMk/>
             <pc:sldMk cId="721824467" sldId="317"/>
             <ac:spMk id="10" creationId="{A4AC5506-6312-4701-8D3C-40187889A947}"/>
           </ac:spMkLst>
         </pc:spChg>
-        <pc:picChg chg="add mod">
-          <ac:chgData name="Md Kauser Ahmmed" userId="81e39d19-8d5c-4ffe-9a82-20799efac8e0" providerId="ADAL" clId="{7D08CCF5-22C4-48DA-9D9F-37A90B395005}" dt="2021-05-07T16:48:19.571" v="428" actId="26606"/>
+        <pc:spChg chg="add">
+          <ac:chgData name="Md Kauser Ahmmed" userId="81e39d19-8d5c-4ffe-9a82-20799efac8e0" providerId="ADAL" clId="{7D08CCF5-22C4-48DA-9D9F-37A90B395005}" dt="2021-06-15T18:07:34.194" v="899" actId="26606"/>
+          <ac:spMkLst>
+            <pc:docMk/>
+            <pc:sldMk cId="721824467" sldId="317"/>
+            <ac:spMk id="15" creationId="{A4AC5506-6312-4701-8D3C-40187889A947}"/>
+          </ac:spMkLst>
+        </pc:spChg>
+        <pc:picChg chg="add del mod">
+          <ac:chgData name="Md Kauser Ahmmed" userId="81e39d19-8d5c-4ffe-9a82-20799efac8e0" providerId="ADAL" clId="{7D08CCF5-22C4-48DA-9D9F-37A90B395005}" dt="2021-06-15T18:07:18.813" v="895" actId="478"/>
           <ac:picMkLst>
             <pc:docMk/>
             <pc:sldMk cId="721824467" sldId="317"/>
             <ac:picMk id="5" creationId="{B2E2FB7E-1C39-45B1-91FF-5E12B087DA1C}"/>
+          </ac:picMkLst>
+        </pc:picChg>
+        <pc:picChg chg="add mod">
+          <ac:chgData name="Md Kauser Ahmmed" userId="81e39d19-8d5c-4ffe-9a82-20799efac8e0" providerId="ADAL" clId="{7D08CCF5-22C4-48DA-9D9F-37A90B395005}" dt="2021-06-15T18:07:34.194" v="899" actId="26606"/>
+          <ac:picMkLst>
+            <pc:docMk/>
+            <pc:sldMk cId="721824467" sldId="317"/>
+            <ac:picMk id="7" creationId="{02DED625-AF17-4723-8901-F2820E352289}"/>
           </ac:picMkLst>
         </pc:picChg>
       </pc:sldChg>
@@ -1040,7 +1120,7 @@
         </pc:spChg>
       </pc:sldChg>
       <pc:sldChg chg="addSp delSp modSp new mod setBg">
-        <pc:chgData name="Md Kauser Ahmmed" userId="81e39d19-8d5c-4ffe-9a82-20799efac8e0" providerId="ADAL" clId="{7D08CCF5-22C4-48DA-9D9F-37A90B395005}" dt="2021-05-07T16:49:05.802" v="490" actId="26606"/>
+        <pc:chgData name="Md Kauser Ahmmed" userId="81e39d19-8d5c-4ffe-9a82-20799efac8e0" providerId="ADAL" clId="{7D08CCF5-22C4-48DA-9D9F-37A90B395005}" dt="2021-06-15T18:07:55.032" v="903" actId="962"/>
         <pc:sldMkLst>
           <pc:docMk/>
           <pc:sldMk cId="4008592907" sldId="318"/>
@@ -1061,6 +1141,14 @@
             <ac:spMk id="3" creationId="{4DB5E257-446A-4B0B-9913-EFBAD05CB70A}"/>
           </ac:spMkLst>
         </pc:spChg>
+        <pc:spChg chg="add del mod">
+          <ac:chgData name="Md Kauser Ahmmed" userId="81e39d19-8d5c-4ffe-9a82-20799efac8e0" providerId="ADAL" clId="{7D08CCF5-22C4-48DA-9D9F-37A90B395005}" dt="2021-06-15T18:07:53.035" v="901" actId="931"/>
+          <ac:spMkLst>
+            <pc:docMk/>
+            <pc:sldMk cId="4008592907" sldId="318"/>
+            <ac:spMk id="4" creationId="{0EEB2536-030B-431F-BF93-AF54F5527F0A}"/>
+          </ac:spMkLst>
+        </pc:spChg>
         <pc:spChg chg="add">
           <ac:chgData name="Md Kauser Ahmmed" userId="81e39d19-8d5c-4ffe-9a82-20799efac8e0" providerId="ADAL" clId="{7D08CCF5-22C4-48DA-9D9F-37A90B395005}" dt="2021-05-07T16:49:05.802" v="490" actId="26606"/>
           <ac:spMkLst>
@@ -1069,17 +1157,25 @@
             <ac:spMk id="10" creationId="{A4AC5506-6312-4701-8D3C-40187889A947}"/>
           </ac:spMkLst>
         </pc:spChg>
-        <pc:picChg chg="add mod">
-          <ac:chgData name="Md Kauser Ahmmed" userId="81e39d19-8d5c-4ffe-9a82-20799efac8e0" providerId="ADAL" clId="{7D08CCF5-22C4-48DA-9D9F-37A90B395005}" dt="2021-05-07T16:49:05.802" v="490" actId="26606"/>
+        <pc:picChg chg="add del mod">
+          <ac:chgData name="Md Kauser Ahmmed" userId="81e39d19-8d5c-4ffe-9a82-20799efac8e0" providerId="ADAL" clId="{7D08CCF5-22C4-48DA-9D9F-37A90B395005}" dt="2021-06-15T18:07:42.925" v="900" actId="478"/>
           <ac:picMkLst>
             <pc:docMk/>
             <pc:sldMk cId="4008592907" sldId="318"/>
             <ac:picMk id="5" creationId="{8CB98548-80D1-40F1-B37F-4D435DB64A77}"/>
           </ac:picMkLst>
         </pc:picChg>
+        <pc:picChg chg="add mod">
+          <ac:chgData name="Md Kauser Ahmmed" userId="81e39d19-8d5c-4ffe-9a82-20799efac8e0" providerId="ADAL" clId="{7D08CCF5-22C4-48DA-9D9F-37A90B395005}" dt="2021-06-15T18:07:55.032" v="903" actId="962"/>
+          <ac:picMkLst>
+            <pc:docMk/>
+            <pc:sldMk cId="4008592907" sldId="318"/>
+            <ac:picMk id="7" creationId="{873113DE-297E-4FC0-935D-BC9C02C84142}"/>
+          </ac:picMkLst>
+        </pc:picChg>
       </pc:sldChg>
       <pc:sldChg chg="addSp delSp modSp new mod setBg">
-        <pc:chgData name="Md Kauser Ahmmed" userId="81e39d19-8d5c-4ffe-9a82-20799efac8e0" providerId="ADAL" clId="{7D08CCF5-22C4-48DA-9D9F-37A90B395005}" dt="2021-05-07T16:49:52.322" v="537" actId="26606"/>
+        <pc:chgData name="Md Kauser Ahmmed" userId="81e39d19-8d5c-4ffe-9a82-20799efac8e0" providerId="ADAL" clId="{7D08CCF5-22C4-48DA-9D9F-37A90B395005}" dt="2021-06-15T18:12:33.732" v="908" actId="26606"/>
         <pc:sldMkLst>
           <pc:docMk/>
           <pc:sldMk cId="866667194" sldId="319"/>
@@ -1100,20 +1196,44 @@
             <ac:spMk id="3" creationId="{C1357435-0C3B-40FF-B90C-283442385640}"/>
           </ac:spMkLst>
         </pc:spChg>
-        <pc:spChg chg="add">
-          <ac:chgData name="Md Kauser Ahmmed" userId="81e39d19-8d5c-4ffe-9a82-20799efac8e0" providerId="ADAL" clId="{7D08CCF5-22C4-48DA-9D9F-37A90B395005}" dt="2021-05-07T16:49:52.322" v="537" actId="26606"/>
+        <pc:spChg chg="add del mod">
+          <ac:chgData name="Md Kauser Ahmmed" userId="81e39d19-8d5c-4ffe-9a82-20799efac8e0" providerId="ADAL" clId="{7D08CCF5-22C4-48DA-9D9F-37A90B395005}" dt="2021-06-15T18:12:31.538" v="905" actId="931"/>
+          <ac:spMkLst>
+            <pc:docMk/>
+            <pc:sldMk cId="866667194" sldId="319"/>
+            <ac:spMk id="4" creationId="{1173985B-F82E-42EC-B5D6-00FCDDD1382C}"/>
+          </ac:spMkLst>
+        </pc:spChg>
+        <pc:spChg chg="add del">
+          <ac:chgData name="Md Kauser Ahmmed" userId="81e39d19-8d5c-4ffe-9a82-20799efac8e0" providerId="ADAL" clId="{7D08CCF5-22C4-48DA-9D9F-37A90B395005}" dt="2021-06-15T18:12:33.732" v="908" actId="26606"/>
           <ac:spMkLst>
             <pc:docMk/>
             <pc:sldMk cId="866667194" sldId="319"/>
             <ac:spMk id="10" creationId="{A4AC5506-6312-4701-8D3C-40187889A947}"/>
           </ac:spMkLst>
         </pc:spChg>
-        <pc:picChg chg="add mod">
-          <ac:chgData name="Md Kauser Ahmmed" userId="81e39d19-8d5c-4ffe-9a82-20799efac8e0" providerId="ADAL" clId="{7D08CCF5-22C4-48DA-9D9F-37A90B395005}" dt="2021-05-07T16:49:52.322" v="537" actId="26606"/>
+        <pc:spChg chg="add">
+          <ac:chgData name="Md Kauser Ahmmed" userId="81e39d19-8d5c-4ffe-9a82-20799efac8e0" providerId="ADAL" clId="{7D08CCF5-22C4-48DA-9D9F-37A90B395005}" dt="2021-06-15T18:12:33.732" v="908" actId="26606"/>
+          <ac:spMkLst>
+            <pc:docMk/>
+            <pc:sldMk cId="866667194" sldId="319"/>
+            <ac:spMk id="15" creationId="{A4AC5506-6312-4701-8D3C-40187889A947}"/>
+          </ac:spMkLst>
+        </pc:spChg>
+        <pc:picChg chg="add del mod">
+          <ac:chgData name="Md Kauser Ahmmed" userId="81e39d19-8d5c-4ffe-9a82-20799efac8e0" providerId="ADAL" clId="{7D08CCF5-22C4-48DA-9D9F-37A90B395005}" dt="2021-06-15T18:12:16.962" v="904" actId="478"/>
           <ac:picMkLst>
             <pc:docMk/>
             <pc:sldMk cId="866667194" sldId="319"/>
             <ac:picMk id="5" creationId="{AC3C2712-638A-40E4-94A2-C7CCFEB7D2DD}"/>
+          </ac:picMkLst>
+        </pc:picChg>
+        <pc:picChg chg="add mod">
+          <ac:chgData name="Md Kauser Ahmmed" userId="81e39d19-8d5c-4ffe-9a82-20799efac8e0" providerId="ADAL" clId="{7D08CCF5-22C4-48DA-9D9F-37A90B395005}" dt="2021-06-15T18:12:33.732" v="908" actId="26606"/>
+          <ac:picMkLst>
+            <pc:docMk/>
+            <pc:sldMk cId="866667194" sldId="319"/>
+            <ac:picMk id="7" creationId="{A18F6B37-55F9-4195-92B8-3A38E2E58478}"/>
           </ac:picMkLst>
         </pc:picChg>
       </pc:sldChg>
@@ -1125,7 +1245,7 @@
         </pc:sldMkLst>
       </pc:sldChg>
       <pc:sldChg chg="addSp delSp modSp new mod setBg">
-        <pc:chgData name="Md Kauser Ahmmed" userId="81e39d19-8d5c-4ffe-9a82-20799efac8e0" providerId="ADAL" clId="{7D08CCF5-22C4-48DA-9D9F-37A90B395005}" dt="2021-05-07T16:50:37.772" v="598" actId="26606"/>
+        <pc:chgData name="Md Kauser Ahmmed" userId="81e39d19-8d5c-4ffe-9a82-20799efac8e0" providerId="ADAL" clId="{7D08CCF5-22C4-48DA-9D9F-37A90B395005}" dt="2021-06-15T18:16:24.426" v="912" actId="962"/>
         <pc:sldMkLst>
           <pc:docMk/>
           <pc:sldMk cId="332899194" sldId="320"/>
@@ -1146,6 +1266,14 @@
             <ac:spMk id="3" creationId="{BAB565F7-49A2-4090-85E8-8C1444E5584C}"/>
           </ac:spMkLst>
         </pc:spChg>
+        <pc:spChg chg="add del mod">
+          <ac:chgData name="Md Kauser Ahmmed" userId="81e39d19-8d5c-4ffe-9a82-20799efac8e0" providerId="ADAL" clId="{7D08CCF5-22C4-48DA-9D9F-37A90B395005}" dt="2021-06-15T18:16:22.280" v="910" actId="931"/>
+          <ac:spMkLst>
+            <pc:docMk/>
+            <pc:sldMk cId="332899194" sldId="320"/>
+            <ac:spMk id="4" creationId="{68599FDC-155F-45FB-A15D-10D6ADE5DE91}"/>
+          </ac:spMkLst>
+        </pc:spChg>
         <pc:spChg chg="add">
           <ac:chgData name="Md Kauser Ahmmed" userId="81e39d19-8d5c-4ffe-9a82-20799efac8e0" providerId="ADAL" clId="{7D08CCF5-22C4-48DA-9D9F-37A90B395005}" dt="2021-05-07T16:50:37.772" v="598" actId="26606"/>
           <ac:spMkLst>
@@ -1154,12 +1282,20 @@
             <ac:spMk id="10" creationId="{A4AC5506-6312-4701-8D3C-40187889A947}"/>
           </ac:spMkLst>
         </pc:spChg>
-        <pc:picChg chg="add mod">
-          <ac:chgData name="Md Kauser Ahmmed" userId="81e39d19-8d5c-4ffe-9a82-20799efac8e0" providerId="ADAL" clId="{7D08CCF5-22C4-48DA-9D9F-37A90B395005}" dt="2021-05-07T16:50:37.772" v="598" actId="26606"/>
+        <pc:picChg chg="add del mod">
+          <ac:chgData name="Md Kauser Ahmmed" userId="81e39d19-8d5c-4ffe-9a82-20799efac8e0" providerId="ADAL" clId="{7D08CCF5-22C4-48DA-9D9F-37A90B395005}" dt="2021-06-15T18:16:12.015" v="909" actId="478"/>
           <ac:picMkLst>
             <pc:docMk/>
             <pc:sldMk cId="332899194" sldId="320"/>
             <ac:picMk id="5" creationId="{119C3688-FB87-498B-8E6A-C827F11F9E12}"/>
+          </ac:picMkLst>
+        </pc:picChg>
+        <pc:picChg chg="add mod">
+          <ac:chgData name="Md Kauser Ahmmed" userId="81e39d19-8d5c-4ffe-9a82-20799efac8e0" providerId="ADAL" clId="{7D08CCF5-22C4-48DA-9D9F-37A90B395005}" dt="2021-06-15T18:16:24.426" v="912" actId="962"/>
+          <ac:picMkLst>
+            <pc:docMk/>
+            <pc:sldMk cId="332899194" sldId="320"/>
+            <ac:picMk id="7" creationId="{E2A7591E-7319-4C3A-A37B-364C4E058532}"/>
           </ac:picMkLst>
         </pc:picChg>
       </pc:sldChg>
@@ -1171,7 +1307,7 @@
         </pc:sldMkLst>
       </pc:sldChg>
       <pc:sldChg chg="addSp delSp modSp new mod setBg">
-        <pc:chgData name="Md Kauser Ahmmed" userId="81e39d19-8d5c-4ffe-9a82-20799efac8e0" providerId="ADAL" clId="{7D08CCF5-22C4-48DA-9D9F-37A90B395005}" dt="2021-05-07T16:51:09.860" v="638" actId="26606"/>
+        <pc:chgData name="Md Kauser Ahmmed" userId="81e39d19-8d5c-4ffe-9a82-20799efac8e0" providerId="ADAL" clId="{7D08CCF5-22C4-48DA-9D9F-37A90B395005}" dt="2021-06-15T18:18:33.426" v="917" actId="26606"/>
         <pc:sldMkLst>
           <pc:docMk/>
           <pc:sldMk cId="1365374616" sldId="321"/>
@@ -1192,20 +1328,44 @@
             <ac:spMk id="3" creationId="{3E718B0B-ECAE-40C7-B0CE-4507C4D504E3}"/>
           </ac:spMkLst>
         </pc:spChg>
-        <pc:spChg chg="add">
-          <ac:chgData name="Md Kauser Ahmmed" userId="81e39d19-8d5c-4ffe-9a82-20799efac8e0" providerId="ADAL" clId="{7D08CCF5-22C4-48DA-9D9F-37A90B395005}" dt="2021-05-07T16:51:09.860" v="638" actId="26606"/>
+        <pc:spChg chg="add del mod">
+          <ac:chgData name="Md Kauser Ahmmed" userId="81e39d19-8d5c-4ffe-9a82-20799efac8e0" providerId="ADAL" clId="{7D08CCF5-22C4-48DA-9D9F-37A90B395005}" dt="2021-06-15T18:18:31.035" v="914" actId="931"/>
+          <ac:spMkLst>
+            <pc:docMk/>
+            <pc:sldMk cId="1365374616" sldId="321"/>
+            <ac:spMk id="4" creationId="{0110DC8E-0AF0-4617-BF84-3707E69DE9B5}"/>
+          </ac:spMkLst>
+        </pc:spChg>
+        <pc:spChg chg="add del">
+          <ac:chgData name="Md Kauser Ahmmed" userId="81e39d19-8d5c-4ffe-9a82-20799efac8e0" providerId="ADAL" clId="{7D08CCF5-22C4-48DA-9D9F-37A90B395005}" dt="2021-06-15T18:18:33.426" v="917" actId="26606"/>
           <ac:spMkLst>
             <pc:docMk/>
             <pc:sldMk cId="1365374616" sldId="321"/>
             <ac:spMk id="10" creationId="{A4AC5506-6312-4701-8D3C-40187889A947}"/>
           </ac:spMkLst>
         </pc:spChg>
-        <pc:picChg chg="add mod">
-          <ac:chgData name="Md Kauser Ahmmed" userId="81e39d19-8d5c-4ffe-9a82-20799efac8e0" providerId="ADAL" clId="{7D08CCF5-22C4-48DA-9D9F-37A90B395005}" dt="2021-05-07T16:51:09.860" v="638" actId="26606"/>
+        <pc:spChg chg="add">
+          <ac:chgData name="Md Kauser Ahmmed" userId="81e39d19-8d5c-4ffe-9a82-20799efac8e0" providerId="ADAL" clId="{7D08CCF5-22C4-48DA-9D9F-37A90B395005}" dt="2021-06-15T18:18:33.426" v="917" actId="26606"/>
+          <ac:spMkLst>
+            <pc:docMk/>
+            <pc:sldMk cId="1365374616" sldId="321"/>
+            <ac:spMk id="15" creationId="{A4AC5506-6312-4701-8D3C-40187889A947}"/>
+          </ac:spMkLst>
+        </pc:spChg>
+        <pc:picChg chg="add del mod">
+          <ac:chgData name="Md Kauser Ahmmed" userId="81e39d19-8d5c-4ffe-9a82-20799efac8e0" providerId="ADAL" clId="{7D08CCF5-22C4-48DA-9D9F-37A90B395005}" dt="2021-06-15T18:18:21.281" v="913" actId="478"/>
           <ac:picMkLst>
             <pc:docMk/>
             <pc:sldMk cId="1365374616" sldId="321"/>
             <ac:picMk id="5" creationId="{086713DA-177E-4B6A-B29D-E8E6E48D4139}"/>
+          </ac:picMkLst>
+        </pc:picChg>
+        <pc:picChg chg="add mod">
+          <ac:chgData name="Md Kauser Ahmmed" userId="81e39d19-8d5c-4ffe-9a82-20799efac8e0" providerId="ADAL" clId="{7D08CCF5-22C4-48DA-9D9F-37A90B395005}" dt="2021-06-15T18:18:33.426" v="917" actId="26606"/>
+          <ac:picMkLst>
+            <pc:docMk/>
+            <pc:sldMk cId="1365374616" sldId="321"/>
+            <ac:picMk id="7" creationId="{2567BE3E-7A3B-406D-A6CB-B1C4AB749FEB}"/>
           </ac:picMkLst>
         </pc:picChg>
       </pc:sldChg>
@@ -1300,7 +1460,7 @@
         </pc:sldMkLst>
       </pc:sldChg>
       <pc:sldChg chg="addSp delSp modSp new mod setBg">
-        <pc:chgData name="Md Kauser Ahmmed" userId="81e39d19-8d5c-4ffe-9a82-20799efac8e0" providerId="ADAL" clId="{7D08CCF5-22C4-48DA-9D9F-37A90B395005}" dt="2021-05-07T16:55:36.897" v="791" actId="26606"/>
+        <pc:chgData name="Md Kauser Ahmmed" userId="81e39d19-8d5c-4ffe-9a82-20799efac8e0" providerId="ADAL" clId="{7D08CCF5-22C4-48DA-9D9F-37A90B395005}" dt="2021-06-15T18:19:56.248" v="927" actId="26606"/>
         <pc:sldMkLst>
           <pc:docMk/>
           <pc:sldMk cId="4188086502" sldId="324"/>
@@ -1321,6 +1481,14 @@
             <ac:spMk id="3" creationId="{9F2A5F5F-4679-46D2-BAD8-2AE2BB4612FA}"/>
           </ac:spMkLst>
         </pc:spChg>
+        <pc:spChg chg="add del mod">
+          <ac:chgData name="Md Kauser Ahmmed" userId="81e39d19-8d5c-4ffe-9a82-20799efac8e0" providerId="ADAL" clId="{7D08CCF5-22C4-48DA-9D9F-37A90B395005}" dt="2021-06-15T18:19:27.159" v="919" actId="478"/>
+          <ac:spMkLst>
+            <pc:docMk/>
+            <pc:sldMk cId="4188086502" sldId="324"/>
+            <ac:spMk id="4" creationId="{812AB768-4A02-4BB4-9A74-BC6DDEE2E5BE}"/>
+          </ac:spMkLst>
+        </pc:spChg>
         <pc:spChg chg="add del">
           <ac:chgData name="Md Kauser Ahmmed" userId="81e39d19-8d5c-4ffe-9a82-20799efac8e0" providerId="ADAL" clId="{7D08CCF5-22C4-48DA-9D9F-37A90B395005}" dt="2021-05-07T16:55:26.021" v="784" actId="26606"/>
           <ac:spMkLst>
@@ -1385,44 +1553,84 @@
             <ac:spMk id="25" creationId="{022BDE4A-8A20-4A69-9C5A-581C82036A4D}"/>
           </ac:spMkLst>
         </pc:spChg>
-        <pc:spChg chg="add">
-          <ac:chgData name="Md Kauser Ahmmed" userId="81e39d19-8d5c-4ffe-9a82-20799efac8e0" providerId="ADAL" clId="{7D08CCF5-22C4-48DA-9D9F-37A90B395005}" dt="2021-05-07T16:55:36.897" v="791" actId="26606"/>
+        <pc:spChg chg="add del">
+          <ac:chgData name="Md Kauser Ahmmed" userId="81e39d19-8d5c-4ffe-9a82-20799efac8e0" providerId="ADAL" clId="{7D08CCF5-22C4-48DA-9D9F-37A90B395005}" dt="2021-06-15T18:19:56.248" v="927" actId="26606"/>
           <ac:spMkLst>
             <pc:docMk/>
             <pc:sldMk cId="4188086502" sldId="324"/>
             <ac:spMk id="27" creationId="{70BDD0CE-06A4-404B-8A13-580229C1C923}"/>
           </ac:spMkLst>
         </pc:spChg>
-        <pc:spChg chg="add">
-          <ac:chgData name="Md Kauser Ahmmed" userId="81e39d19-8d5c-4ffe-9a82-20799efac8e0" providerId="ADAL" clId="{7D08CCF5-22C4-48DA-9D9F-37A90B395005}" dt="2021-05-07T16:55:36.897" v="791" actId="26606"/>
+        <pc:spChg chg="add del">
+          <ac:chgData name="Md Kauser Ahmmed" userId="81e39d19-8d5c-4ffe-9a82-20799efac8e0" providerId="ADAL" clId="{7D08CCF5-22C4-48DA-9D9F-37A90B395005}" dt="2021-06-15T18:19:56.248" v="927" actId="26606"/>
           <ac:spMkLst>
             <pc:docMk/>
             <pc:sldMk cId="4188086502" sldId="324"/>
             <ac:spMk id="28" creationId="{EE9899FA-8881-472C-AA59-D08A89CA8AEF}"/>
           </ac:spMkLst>
         </pc:spChg>
-        <pc:spChg chg="add">
-          <ac:chgData name="Md Kauser Ahmmed" userId="81e39d19-8d5c-4ffe-9a82-20799efac8e0" providerId="ADAL" clId="{7D08CCF5-22C4-48DA-9D9F-37A90B395005}" dt="2021-05-07T16:55:36.897" v="791" actId="26606"/>
+        <pc:spChg chg="add del">
+          <ac:chgData name="Md Kauser Ahmmed" userId="81e39d19-8d5c-4ffe-9a82-20799efac8e0" providerId="ADAL" clId="{7D08CCF5-22C4-48DA-9D9F-37A90B395005}" dt="2021-06-15T18:19:56.248" v="927" actId="26606"/>
           <ac:spMkLst>
             <pc:docMk/>
             <pc:sldMk cId="4188086502" sldId="324"/>
             <ac:spMk id="29" creationId="{080B7D90-3DF1-4514-B26D-616BE35553C9}"/>
           </ac:spMkLst>
         </pc:spChg>
-        <pc:picChg chg="add mod ord">
-          <ac:chgData name="Md Kauser Ahmmed" userId="81e39d19-8d5c-4ffe-9a82-20799efac8e0" providerId="ADAL" clId="{7D08CCF5-22C4-48DA-9D9F-37A90B395005}" dt="2021-05-07T16:55:36.897" v="791" actId="26606"/>
+        <pc:spChg chg="add">
+          <ac:chgData name="Md Kauser Ahmmed" userId="81e39d19-8d5c-4ffe-9a82-20799efac8e0" providerId="ADAL" clId="{7D08CCF5-22C4-48DA-9D9F-37A90B395005}" dt="2021-06-15T18:19:56.248" v="927" actId="26606"/>
+          <ac:spMkLst>
+            <pc:docMk/>
+            <pc:sldMk cId="4188086502" sldId="324"/>
+            <ac:spMk id="34" creationId="{70BDD0CE-06A4-404B-8A13-580229C1C923}"/>
+          </ac:spMkLst>
+        </pc:spChg>
+        <pc:spChg chg="add">
+          <ac:chgData name="Md Kauser Ahmmed" userId="81e39d19-8d5c-4ffe-9a82-20799efac8e0" providerId="ADAL" clId="{7D08CCF5-22C4-48DA-9D9F-37A90B395005}" dt="2021-06-15T18:19:56.248" v="927" actId="26606"/>
+          <ac:spMkLst>
+            <pc:docMk/>
+            <pc:sldMk cId="4188086502" sldId="324"/>
+            <ac:spMk id="36" creationId="{EE9899FA-8881-472C-AA59-D08A89CA8AEF}"/>
+          </ac:spMkLst>
+        </pc:spChg>
+        <pc:spChg chg="add">
+          <ac:chgData name="Md Kauser Ahmmed" userId="81e39d19-8d5c-4ffe-9a82-20799efac8e0" providerId="ADAL" clId="{7D08CCF5-22C4-48DA-9D9F-37A90B395005}" dt="2021-06-15T18:19:56.248" v="927" actId="26606"/>
+          <ac:spMkLst>
+            <pc:docMk/>
+            <pc:sldMk cId="4188086502" sldId="324"/>
+            <ac:spMk id="38" creationId="{080B7D90-3DF1-4514-B26D-616BE35553C9}"/>
+          </ac:spMkLst>
+        </pc:spChg>
+        <pc:picChg chg="add del mod ord">
+          <ac:chgData name="Md Kauser Ahmmed" userId="81e39d19-8d5c-4ffe-9a82-20799efac8e0" providerId="ADAL" clId="{7D08CCF5-22C4-48DA-9D9F-37A90B395005}" dt="2021-06-15T18:19:19.973" v="918" actId="478"/>
           <ac:picMkLst>
             <pc:docMk/>
             <pc:sldMk cId="4188086502" sldId="324"/>
             <ac:picMk id="5" creationId="{97334AFF-E01A-4EA6-AA16-113496645160}"/>
           </ac:picMkLst>
         </pc:picChg>
-        <pc:picChg chg="add mod">
-          <ac:chgData name="Md Kauser Ahmmed" userId="81e39d19-8d5c-4ffe-9a82-20799efac8e0" providerId="ADAL" clId="{7D08CCF5-22C4-48DA-9D9F-37A90B395005}" dt="2021-05-07T16:55:36.897" v="791" actId="26606"/>
+        <pc:picChg chg="add del mod">
+          <ac:chgData name="Md Kauser Ahmmed" userId="81e39d19-8d5c-4ffe-9a82-20799efac8e0" providerId="ADAL" clId="{7D08CCF5-22C4-48DA-9D9F-37A90B395005}" dt="2021-06-15T18:19:28.066" v="920" actId="478"/>
           <ac:picMkLst>
             <pc:docMk/>
             <pc:sldMk cId="4188086502" sldId="324"/>
             <ac:picMk id="7" creationId="{9E0B625D-0A53-46CB-9097-16987DC79266}"/>
+          </ac:picMkLst>
+        </pc:picChg>
+        <pc:picChg chg="add mod">
+          <ac:chgData name="Md Kauser Ahmmed" userId="81e39d19-8d5c-4ffe-9a82-20799efac8e0" providerId="ADAL" clId="{7D08CCF5-22C4-48DA-9D9F-37A90B395005}" dt="2021-06-15T18:19:56.248" v="927" actId="26606"/>
+          <ac:picMkLst>
+            <pc:docMk/>
+            <pc:sldMk cId="4188086502" sldId="324"/>
+            <ac:picMk id="8" creationId="{ABA36051-11B7-48DB-87BE-FA5459C40F2A}"/>
+          </ac:picMkLst>
+        </pc:picChg>
+        <pc:picChg chg="add mod">
+          <ac:chgData name="Md Kauser Ahmmed" userId="81e39d19-8d5c-4ffe-9a82-20799efac8e0" providerId="ADAL" clId="{7D08CCF5-22C4-48DA-9D9F-37A90B395005}" dt="2021-06-15T18:19:56.248" v="927" actId="26606"/>
+          <ac:picMkLst>
+            <pc:docMk/>
+            <pc:sldMk cId="4188086502" sldId="324"/>
+            <ac:picMk id="10" creationId="{941889A4-0169-4953-950D-4ECB19F3B788}"/>
           </ac:picMkLst>
         </pc:picChg>
         <pc:cxnChg chg="add del">
@@ -1435,7 +1643,7 @@
         </pc:cxnChg>
       </pc:sldChg>
       <pc:sldChg chg="addSp delSp modSp new mod setBg">
-        <pc:chgData name="Md Kauser Ahmmed" userId="81e39d19-8d5c-4ffe-9a82-20799efac8e0" providerId="ADAL" clId="{7D08CCF5-22C4-48DA-9D9F-37A90B395005}" dt="2021-05-07T16:56:21.444" v="826" actId="26606"/>
+        <pc:chgData name="Md Kauser Ahmmed" userId="81e39d19-8d5c-4ffe-9a82-20799efac8e0" providerId="ADAL" clId="{7D08CCF5-22C4-48DA-9D9F-37A90B395005}" dt="2021-06-15T18:20:26.249" v="936" actId="26606"/>
         <pc:sldMkLst>
           <pc:docMk/>
           <pc:sldMk cId="1794764492" sldId="325"/>
@@ -1456,44 +1664,92 @@
             <ac:spMk id="3" creationId="{43A77A09-4DDD-4D7C-A53E-F578F740BB42}"/>
           </ac:spMkLst>
         </pc:spChg>
-        <pc:spChg chg="add">
-          <ac:chgData name="Md Kauser Ahmmed" userId="81e39d19-8d5c-4ffe-9a82-20799efac8e0" providerId="ADAL" clId="{7D08CCF5-22C4-48DA-9D9F-37A90B395005}" dt="2021-05-07T16:56:21.444" v="826" actId="26606"/>
+        <pc:spChg chg="add del mod">
+          <ac:chgData name="Md Kauser Ahmmed" userId="81e39d19-8d5c-4ffe-9a82-20799efac8e0" providerId="ADAL" clId="{7D08CCF5-22C4-48DA-9D9F-37A90B395005}" dt="2021-06-15T18:20:15.613" v="930" actId="931"/>
+          <ac:spMkLst>
+            <pc:docMk/>
+            <pc:sldMk cId="1794764492" sldId="325"/>
+            <ac:spMk id="4" creationId="{97CC52C6-D97C-4EBA-B3F0-E5165549FD9A}"/>
+          </ac:spMkLst>
+        </pc:spChg>
+        <pc:spChg chg="add del">
+          <ac:chgData name="Md Kauser Ahmmed" userId="81e39d19-8d5c-4ffe-9a82-20799efac8e0" providerId="ADAL" clId="{7D08CCF5-22C4-48DA-9D9F-37A90B395005}" dt="2021-06-15T18:20:26.249" v="936" actId="26606"/>
           <ac:spMkLst>
             <pc:docMk/>
             <pc:sldMk cId="1794764492" sldId="325"/>
             <ac:spMk id="12" creationId="{70BDD0CE-06A4-404B-8A13-580229C1C923}"/>
           </ac:spMkLst>
         </pc:spChg>
-        <pc:spChg chg="add">
-          <ac:chgData name="Md Kauser Ahmmed" userId="81e39d19-8d5c-4ffe-9a82-20799efac8e0" providerId="ADAL" clId="{7D08CCF5-22C4-48DA-9D9F-37A90B395005}" dt="2021-05-07T16:56:21.444" v="826" actId="26606"/>
+        <pc:spChg chg="add del">
+          <ac:chgData name="Md Kauser Ahmmed" userId="81e39d19-8d5c-4ffe-9a82-20799efac8e0" providerId="ADAL" clId="{7D08CCF5-22C4-48DA-9D9F-37A90B395005}" dt="2021-06-15T18:20:26.249" v="936" actId="26606"/>
           <ac:spMkLst>
             <pc:docMk/>
             <pc:sldMk cId="1794764492" sldId="325"/>
             <ac:spMk id="14" creationId="{EE9899FA-8881-472C-AA59-D08A89CA8AEF}"/>
           </ac:spMkLst>
         </pc:spChg>
-        <pc:spChg chg="add">
-          <ac:chgData name="Md Kauser Ahmmed" userId="81e39d19-8d5c-4ffe-9a82-20799efac8e0" providerId="ADAL" clId="{7D08CCF5-22C4-48DA-9D9F-37A90B395005}" dt="2021-05-07T16:56:21.444" v="826" actId="26606"/>
+        <pc:spChg chg="add del">
+          <ac:chgData name="Md Kauser Ahmmed" userId="81e39d19-8d5c-4ffe-9a82-20799efac8e0" providerId="ADAL" clId="{7D08CCF5-22C4-48DA-9D9F-37A90B395005}" dt="2021-06-15T18:20:26.249" v="936" actId="26606"/>
           <ac:spMkLst>
             <pc:docMk/>
             <pc:sldMk cId="1794764492" sldId="325"/>
             <ac:spMk id="16" creationId="{080B7D90-3DF1-4514-B26D-616BE35553C9}"/>
           </ac:spMkLst>
         </pc:spChg>
-        <pc:picChg chg="add mod">
-          <ac:chgData name="Md Kauser Ahmmed" userId="81e39d19-8d5c-4ffe-9a82-20799efac8e0" providerId="ADAL" clId="{7D08CCF5-22C4-48DA-9D9F-37A90B395005}" dt="2021-05-07T16:56:21.444" v="826" actId="26606"/>
+        <pc:spChg chg="add">
+          <ac:chgData name="Md Kauser Ahmmed" userId="81e39d19-8d5c-4ffe-9a82-20799efac8e0" providerId="ADAL" clId="{7D08CCF5-22C4-48DA-9D9F-37A90B395005}" dt="2021-06-15T18:20:26.249" v="936" actId="26606"/>
+          <ac:spMkLst>
+            <pc:docMk/>
+            <pc:sldMk cId="1794764492" sldId="325"/>
+            <ac:spMk id="21" creationId="{70BDD0CE-06A4-404B-8A13-580229C1C923}"/>
+          </ac:spMkLst>
+        </pc:spChg>
+        <pc:spChg chg="add">
+          <ac:chgData name="Md Kauser Ahmmed" userId="81e39d19-8d5c-4ffe-9a82-20799efac8e0" providerId="ADAL" clId="{7D08CCF5-22C4-48DA-9D9F-37A90B395005}" dt="2021-06-15T18:20:26.249" v="936" actId="26606"/>
+          <ac:spMkLst>
+            <pc:docMk/>
+            <pc:sldMk cId="1794764492" sldId="325"/>
+            <ac:spMk id="23" creationId="{EE9899FA-8881-472C-AA59-D08A89CA8AEF}"/>
+          </ac:spMkLst>
+        </pc:spChg>
+        <pc:spChg chg="add">
+          <ac:chgData name="Md Kauser Ahmmed" userId="81e39d19-8d5c-4ffe-9a82-20799efac8e0" providerId="ADAL" clId="{7D08CCF5-22C4-48DA-9D9F-37A90B395005}" dt="2021-06-15T18:20:26.249" v="936" actId="26606"/>
+          <ac:spMkLst>
+            <pc:docMk/>
+            <pc:sldMk cId="1794764492" sldId="325"/>
+            <ac:spMk id="25" creationId="{080B7D90-3DF1-4514-B26D-616BE35553C9}"/>
+          </ac:spMkLst>
+        </pc:spChg>
+        <pc:picChg chg="add del mod">
+          <ac:chgData name="Md Kauser Ahmmed" userId="81e39d19-8d5c-4ffe-9a82-20799efac8e0" providerId="ADAL" clId="{7D08CCF5-22C4-48DA-9D9F-37A90B395005}" dt="2021-06-15T18:20:04.611" v="928" actId="478"/>
           <ac:picMkLst>
             <pc:docMk/>
             <pc:sldMk cId="1794764492" sldId="325"/>
             <ac:picMk id="5" creationId="{F578C108-86CB-47F7-B624-1EC12B4D1C09}"/>
           </ac:picMkLst>
         </pc:picChg>
-        <pc:picChg chg="add mod">
-          <ac:chgData name="Md Kauser Ahmmed" userId="81e39d19-8d5c-4ffe-9a82-20799efac8e0" providerId="ADAL" clId="{7D08CCF5-22C4-48DA-9D9F-37A90B395005}" dt="2021-05-07T16:56:21.444" v="826" actId="26606"/>
+        <pc:picChg chg="add del mod">
+          <ac:chgData name="Md Kauser Ahmmed" userId="81e39d19-8d5c-4ffe-9a82-20799efac8e0" providerId="ADAL" clId="{7D08CCF5-22C4-48DA-9D9F-37A90B395005}" dt="2021-06-15T18:20:06.431" v="929" actId="478"/>
           <ac:picMkLst>
             <pc:docMk/>
             <pc:sldMk cId="1794764492" sldId="325"/>
             <ac:picMk id="7" creationId="{B1DFD8A7-4E1E-4998-8DC9-403C7C2FC980}"/>
+          </ac:picMkLst>
+        </pc:picChg>
+        <pc:picChg chg="add mod">
+          <ac:chgData name="Md Kauser Ahmmed" userId="81e39d19-8d5c-4ffe-9a82-20799efac8e0" providerId="ADAL" clId="{7D08CCF5-22C4-48DA-9D9F-37A90B395005}" dt="2021-06-15T18:20:26.249" v="936" actId="26606"/>
+          <ac:picMkLst>
+            <pc:docMk/>
+            <pc:sldMk cId="1794764492" sldId="325"/>
+            <ac:picMk id="8" creationId="{17C38845-A40E-4EA1-B4CC-E5E57067A65C}"/>
+          </ac:picMkLst>
+        </pc:picChg>
+        <pc:picChg chg="add mod">
+          <ac:chgData name="Md Kauser Ahmmed" userId="81e39d19-8d5c-4ffe-9a82-20799efac8e0" providerId="ADAL" clId="{7D08CCF5-22C4-48DA-9D9F-37A90B395005}" dt="2021-06-15T18:20:26.249" v="936" actId="26606"/>
+          <ac:picMkLst>
+            <pc:docMk/>
+            <pc:sldMk cId="1794764492" sldId="325"/>
+            <ac:picMk id="10" creationId="{C504523E-28B8-4961-B183-0C5A187E74CA}"/>
           </ac:picMkLst>
         </pc:picChg>
       </pc:sldChg>
@@ -2699,7 +2955,7 @@
           <a:p>
             <a:fld id="{E0E6B7C7-F232-4E49-A950-FE41516D56E2}" type="datetimeFigureOut">
               <a:rPr lang="en-US" smtClean="0"/>
-              <a:t>5/7/2021</a:t>
+              <a:t>6/15/2021</a:t>
             </a:fld>
             <a:endParaRPr lang="en-US"/>
           </a:p>
@@ -3365,7 +3621,7 @@
           <a:p>
             <a:fld id="{9D01B9CF-4F71-45CB-B0F9-5377CB0F66EB}" type="datetimeFigureOut">
               <a:rPr lang="en-US" smtClean="0"/>
-              <a:t>5/7/2021</a:t>
+              <a:t>6/15/2021</a:t>
             </a:fld>
             <a:endParaRPr lang="en-US"/>
           </a:p>
@@ -3563,7 +3819,7 @@
           <a:p>
             <a:fld id="{9D01B9CF-4F71-45CB-B0F9-5377CB0F66EB}" type="datetimeFigureOut">
               <a:rPr lang="en-US" smtClean="0"/>
-              <a:t>5/7/2021</a:t>
+              <a:t>6/15/2021</a:t>
             </a:fld>
             <a:endParaRPr lang="en-US"/>
           </a:p>
@@ -3771,7 +4027,7 @@
           <a:p>
             <a:fld id="{9D01B9CF-4F71-45CB-B0F9-5377CB0F66EB}" type="datetimeFigureOut">
               <a:rPr lang="en-US" smtClean="0"/>
-              <a:t>5/7/2021</a:t>
+              <a:t>6/15/2021</a:t>
             </a:fld>
             <a:endParaRPr lang="en-US"/>
           </a:p>
@@ -3969,7 +4225,7 @@
           <a:p>
             <a:fld id="{9D01B9CF-4F71-45CB-B0F9-5377CB0F66EB}" type="datetimeFigureOut">
               <a:rPr lang="en-US" smtClean="0"/>
-              <a:t>5/7/2021</a:t>
+              <a:t>6/15/2021</a:t>
             </a:fld>
             <a:endParaRPr lang="en-US"/>
           </a:p>
@@ -4244,7 +4500,7 @@
           <a:p>
             <a:fld id="{9D01B9CF-4F71-45CB-B0F9-5377CB0F66EB}" type="datetimeFigureOut">
               <a:rPr lang="en-US" smtClean="0"/>
-              <a:t>5/7/2021</a:t>
+              <a:t>6/15/2021</a:t>
             </a:fld>
             <a:endParaRPr lang="en-US"/>
           </a:p>
@@ -4509,7 +4765,7 @@
           <a:p>
             <a:fld id="{9D01B9CF-4F71-45CB-B0F9-5377CB0F66EB}" type="datetimeFigureOut">
               <a:rPr lang="en-US" smtClean="0"/>
-              <a:t>5/7/2021</a:t>
+              <a:t>6/15/2021</a:t>
             </a:fld>
             <a:endParaRPr lang="en-US"/>
           </a:p>
@@ -4921,7 +5177,7 @@
           <a:p>
             <a:fld id="{9D01B9CF-4F71-45CB-B0F9-5377CB0F66EB}" type="datetimeFigureOut">
               <a:rPr lang="en-US" smtClean="0"/>
-              <a:t>5/7/2021</a:t>
+              <a:t>6/15/2021</a:t>
             </a:fld>
             <a:endParaRPr lang="en-US"/>
           </a:p>
@@ -5062,7 +5318,7 @@
           <a:p>
             <a:fld id="{9D01B9CF-4F71-45CB-B0F9-5377CB0F66EB}" type="datetimeFigureOut">
               <a:rPr lang="en-US" smtClean="0"/>
-              <a:t>5/7/2021</a:t>
+              <a:t>6/15/2021</a:t>
             </a:fld>
             <a:endParaRPr lang="en-US"/>
           </a:p>
@@ -5175,7 +5431,7 @@
           <a:p>
             <a:fld id="{9D01B9CF-4F71-45CB-B0F9-5377CB0F66EB}" type="datetimeFigureOut">
               <a:rPr lang="en-US" smtClean="0"/>
-              <a:t>5/7/2021</a:t>
+              <a:t>6/15/2021</a:t>
             </a:fld>
             <a:endParaRPr lang="en-US"/>
           </a:p>
@@ -5486,7 +5742,7 @@
           <a:p>
             <a:fld id="{9D01B9CF-4F71-45CB-B0F9-5377CB0F66EB}" type="datetimeFigureOut">
               <a:rPr lang="en-US" smtClean="0"/>
-              <a:t>5/7/2021</a:t>
+              <a:t>6/15/2021</a:t>
             </a:fld>
             <a:endParaRPr lang="en-US"/>
           </a:p>
@@ -5774,7 +6030,7 @@
           <a:p>
             <a:fld id="{9D01B9CF-4F71-45CB-B0F9-5377CB0F66EB}" type="datetimeFigureOut">
               <a:rPr lang="en-US" smtClean="0"/>
-              <a:t>5/7/2021</a:t>
+              <a:t>6/15/2021</a:t>
             </a:fld>
             <a:endParaRPr lang="en-US"/>
           </a:p>
@@ -6015,7 +6271,7 @@
           <a:p>
             <a:fld id="{9D01B9CF-4F71-45CB-B0F9-5377CB0F66EB}" type="datetimeFigureOut">
               <a:rPr lang="en-US" smtClean="0"/>
-              <a:t>5/7/2021</a:t>
+              <a:t>6/15/2021</a:t>
             </a:fld>
             <a:endParaRPr lang="en-US"/>
           </a:p>
@@ -7101,7 +7357,7 @@
                         </a:spcAft>
                       </a:pPr>
                       <a:r>
-                        <a:rPr lang="en-US" sz="2300" cap="none" spc="0">
+                        <a:rPr lang="en-US" sz="2300" cap="none" spc="0" dirty="0">
                           <a:solidFill>
                             <a:schemeClr val="tx1"/>
                           </a:solidFill>
@@ -7109,7 +7365,7 @@
                         </a:rPr>
                         <a:t>0.33</a:t>
                       </a:r>
-                      <a:endParaRPr lang="en-US" sz="2300" cap="none" spc="0">
+                      <a:endParaRPr lang="en-US" sz="2300" cap="none" spc="0" dirty="0">
                         <a:solidFill>
                           <a:schemeClr val="tx1"/>
                         </a:solidFill>
@@ -7156,7 +7412,7 @@
                         </a:spcAft>
                       </a:pPr>
                       <a:r>
-                        <a:rPr lang="en-US" sz="2300" cap="none" spc="0">
+                        <a:rPr lang="en-US" sz="2300" cap="none" spc="0" dirty="0">
                           <a:solidFill>
                             <a:schemeClr val="tx1"/>
                           </a:solidFill>
@@ -7164,7 +7420,7 @@
                         </a:rPr>
                         <a:t>0.038</a:t>
                       </a:r>
-                      <a:endParaRPr lang="en-US" sz="2300" cap="none" spc="0">
+                      <a:endParaRPr lang="en-US" sz="2300" cap="none" spc="0" dirty="0">
                         <a:solidFill>
                           <a:schemeClr val="tx1"/>
                         </a:solidFill>
@@ -7211,7 +7467,7 @@
                         </a:spcAft>
                       </a:pPr>
                       <a:r>
-                        <a:rPr lang="en-US" sz="2300" cap="none" spc="0">
+                        <a:rPr lang="en-US" sz="2300" cap="none" spc="0" dirty="0">
                           <a:solidFill>
                             <a:schemeClr val="tx1"/>
                           </a:solidFill>
@@ -7219,7 +7475,7 @@
                         </a:rPr>
                         <a:t>0.056</a:t>
                       </a:r>
-                      <a:endParaRPr lang="en-US" sz="2300" cap="none" spc="0">
+                      <a:endParaRPr lang="en-US" sz="2300" cap="none" spc="0" dirty="0">
                         <a:solidFill>
                           <a:schemeClr val="tx1"/>
                         </a:solidFill>
@@ -7393,7 +7649,7 @@
                         </a:spcAft>
                       </a:pPr>
                       <a:r>
-                        <a:rPr lang="en-US" sz="2300" cap="none" spc="0">
+                        <a:rPr lang="en-US" sz="2300" cap="none" spc="0" dirty="0">
                           <a:solidFill>
                             <a:schemeClr val="tx1"/>
                           </a:solidFill>
@@ -7401,7 +7657,7 @@
                         </a:rPr>
                         <a:t>3.99</a:t>
                       </a:r>
-                      <a:endParaRPr lang="en-US" sz="2300" cap="none" spc="0">
+                      <a:endParaRPr lang="en-US" sz="2300" cap="none" spc="0" dirty="0">
                         <a:solidFill>
                           <a:schemeClr val="tx1"/>
                         </a:solidFill>
@@ -7453,7 +7709,7 @@
                         </a:spcAft>
                       </a:pPr>
                       <a:r>
-                        <a:rPr lang="en-US" sz="2300" cap="none" spc="0">
+                        <a:rPr lang="en-US" sz="2300" cap="none" spc="0" dirty="0">
                           <a:solidFill>
                             <a:schemeClr val="tx1"/>
                           </a:solidFill>
@@ -7461,7 +7717,7 @@
                         </a:rPr>
                         <a:t>0.53</a:t>
                       </a:r>
-                      <a:endParaRPr lang="en-US" sz="2300" cap="none" spc="0">
+                      <a:endParaRPr lang="en-US" sz="2300" cap="none" spc="0" dirty="0">
                         <a:solidFill>
                           <a:schemeClr val="tx1"/>
                         </a:solidFill>
@@ -7513,7 +7769,7 @@
                         </a:spcAft>
                       </a:pPr>
                       <a:r>
-                        <a:rPr lang="en-US" sz="2300" cap="none" spc="0">
+                        <a:rPr lang="en-US" sz="2300" cap="none" spc="0" dirty="0">
                           <a:solidFill>
                             <a:schemeClr val="tx1"/>
                           </a:solidFill>
@@ -7521,7 +7777,7 @@
                         </a:rPr>
                         <a:t>0.14</a:t>
                       </a:r>
-                      <a:endParaRPr lang="en-US" sz="2300" cap="none" spc="0">
+                      <a:endParaRPr lang="en-US" sz="2300" cap="none" spc="0" dirty="0">
                         <a:solidFill>
                           <a:schemeClr val="tx1"/>
                         </a:solidFill>
@@ -7987,7 +8243,7 @@
                         </a:spcAft>
                       </a:pPr>
                       <a:r>
-                        <a:rPr lang="en-US" sz="2300" cap="none" spc="0">
+                        <a:rPr lang="en-US" sz="2300" cap="none" spc="0" dirty="0">
                           <a:solidFill>
                             <a:schemeClr val="tx1"/>
                           </a:solidFill>
@@ -7995,7 +8251,7 @@
                         </a:rPr>
                         <a:t>16.92</a:t>
                       </a:r>
-                      <a:endParaRPr lang="en-US" sz="2300" cap="none" spc="0">
+                      <a:endParaRPr lang="en-US" sz="2300" cap="none" spc="0" dirty="0">
                         <a:solidFill>
                           <a:schemeClr val="tx1"/>
                         </a:solidFill>
@@ -8047,7 +8303,7 @@
                         </a:spcAft>
                       </a:pPr>
                       <a:r>
-                        <a:rPr lang="en-US" sz="2300" cap="none" spc="0">
+                        <a:rPr lang="en-US" sz="2300" cap="none" spc="0" dirty="0">
                           <a:solidFill>
                             <a:schemeClr val="tx1"/>
                           </a:solidFill>
@@ -8055,7 +8311,7 @@
                         </a:rPr>
                         <a:t>1.07</a:t>
                       </a:r>
-                      <a:endParaRPr lang="en-US" sz="2300" cap="none" spc="0">
+                      <a:endParaRPr lang="en-US" sz="2300" cap="none" spc="0" dirty="0">
                         <a:solidFill>
                           <a:schemeClr val="tx1"/>
                         </a:solidFill>
@@ -8107,7 +8363,7 @@
                         </a:spcAft>
                       </a:pPr>
                       <a:r>
-                        <a:rPr lang="en-US" sz="2300" cap="none" spc="0">
+                        <a:rPr lang="en-US" sz="2300" cap="none" spc="0" dirty="0">
                           <a:solidFill>
                             <a:schemeClr val="tx1"/>
                           </a:solidFill>
@@ -8115,7 +8371,7 @@
                         </a:rPr>
                         <a:t>1.05</a:t>
                       </a:r>
-                      <a:endParaRPr lang="en-US" sz="2300" cap="none" spc="0">
+                      <a:endParaRPr lang="en-US" sz="2300" cap="none" spc="0" dirty="0">
                         <a:solidFill>
                           <a:schemeClr val="tx1"/>
                         </a:solidFill>
@@ -8319,7 +8575,7 @@
       </p:sp>
       <p:sp>
         <p:nvSpPr>
-          <p:cNvPr id="27" name="Rectangle 11">
+          <p:cNvPr id="34" name="Rectangle 33">
             <a:extLst>
               <a:ext uri="{FF2B5EF4-FFF2-40B4-BE49-F238E27FC236}">
                 <a16:creationId xmlns:a16="http://schemas.microsoft.com/office/drawing/2014/main" id="{70BDD0CE-06A4-404B-8A13-580229C1C923}"/>
@@ -8349,7 +8605,7 @@
             <a:avLst/>
           </a:prstGeom>
           <a:solidFill>
-            <a:srgbClr val="48384D"/>
+            <a:srgbClr val="5C7176"/>
           </a:solidFill>
           <a:ln>
             <a:noFill/>
@@ -8382,7 +8638,7 @@
       </p:sp>
       <p:sp>
         <p:nvSpPr>
-          <p:cNvPr id="28" name="Rounded Rectangle 26">
+          <p:cNvPr id="36" name="Rounded Rectangle 26">
             <a:extLst>
               <a:ext uri="{FF2B5EF4-FFF2-40B4-BE49-F238E27FC236}">
                 <a16:creationId xmlns:a16="http://schemas.microsoft.com/office/drawing/2014/main" id="{EE9899FA-8881-472C-AA59-D08A89CA8AEF}"/>
@@ -8456,19 +8712,17 @@
       </p:sp>
       <p:pic>
         <p:nvPicPr>
-          <p:cNvPr id="5" name="Content Placeholder 4" descr="Chart, line chart&#10;&#10;Description automatically generated">
+          <p:cNvPr id="8" name="Picture 7" descr="Chart, line chart&#10;&#10;Description automatically generated">
             <a:extLst>
               <a:ext uri="{FF2B5EF4-FFF2-40B4-BE49-F238E27FC236}">
-                <a16:creationId xmlns:a16="http://schemas.microsoft.com/office/drawing/2014/main" id="{97334AFF-E01A-4EA6-AA16-113496645160}"/>
+                <a16:creationId xmlns:a16="http://schemas.microsoft.com/office/drawing/2014/main" id="{ABA36051-11B7-48DB-87BE-FA5459C40F2A}"/>
               </a:ext>
             </a:extLst>
           </p:cNvPr>
           <p:cNvPicPr>
-            <a:picLocks noGrp="1" noChangeAspect="1"/>
+            <a:picLocks noChangeAspect="1"/>
           </p:cNvPicPr>
-          <p:nvPr>
-            <p:ph idx="1"/>
-          </p:nvPr>
+          <p:nvPr/>
         </p:nvPicPr>
         <p:blipFill>
           <a:blip r:embed="rId2">
@@ -8494,7 +8748,7 @@
       </p:pic>
       <p:sp>
         <p:nvSpPr>
-          <p:cNvPr id="29" name="Rounded Rectangle 16">
+          <p:cNvPr id="38" name="Rounded Rectangle 16">
             <a:extLst>
               <a:ext uri="{FF2B5EF4-FFF2-40B4-BE49-F238E27FC236}">
                 <a16:creationId xmlns:a16="http://schemas.microsoft.com/office/drawing/2014/main" id="{080B7D90-3DF1-4514-B26D-616BE35553C9}"/>
@@ -8568,10 +8822,10 @@
       </p:sp>
       <p:pic>
         <p:nvPicPr>
-          <p:cNvPr id="7" name="Picture 6" descr="Chart&#10;&#10;Description automatically generated">
+          <p:cNvPr id="10" name="Picture 9" descr="Chart&#10;&#10;Description automatically generated">
             <a:extLst>
               <a:ext uri="{FF2B5EF4-FFF2-40B4-BE49-F238E27FC236}">
-                <a16:creationId xmlns:a16="http://schemas.microsoft.com/office/drawing/2014/main" id="{9E0B625D-0A53-46CB-9097-16987DC79266}"/>
+                <a16:creationId xmlns:a16="http://schemas.microsoft.com/office/drawing/2014/main" id="{941889A4-0169-4953-950D-4ECB19F3B788}"/>
               </a:ext>
             </a:extLst>
           </p:cNvPr>
@@ -8678,7 +8932,7 @@
       </p:sp>
       <p:sp>
         <p:nvSpPr>
-          <p:cNvPr id="12" name="Rectangle 11">
+          <p:cNvPr id="21" name="Rectangle 20">
             <a:extLst>
               <a:ext uri="{FF2B5EF4-FFF2-40B4-BE49-F238E27FC236}">
                 <a16:creationId xmlns:a16="http://schemas.microsoft.com/office/drawing/2014/main" id="{70BDD0CE-06A4-404B-8A13-580229C1C923}"/>
@@ -8708,7 +8962,7 @@
             <a:avLst/>
           </a:prstGeom>
           <a:solidFill>
-            <a:srgbClr val="516165"/>
+            <a:srgbClr val="5B7075"/>
           </a:solidFill>
           <a:ln>
             <a:noFill/>
@@ -8741,7 +8995,7 @@
       </p:sp>
       <p:sp>
         <p:nvSpPr>
-          <p:cNvPr id="14" name="Rounded Rectangle 26">
+          <p:cNvPr id="23" name="Rounded Rectangle 26">
             <a:extLst>
               <a:ext uri="{FF2B5EF4-FFF2-40B4-BE49-F238E27FC236}">
                 <a16:creationId xmlns:a16="http://schemas.microsoft.com/office/drawing/2014/main" id="{EE9899FA-8881-472C-AA59-D08A89CA8AEF}"/>
@@ -8815,10 +9069,10 @@
       </p:sp>
       <p:pic>
         <p:nvPicPr>
-          <p:cNvPr id="5" name="Content Placeholder 4" descr="Chart, line chart&#10;&#10;Description automatically generated">
+          <p:cNvPr id="8" name="Content Placeholder 7" descr="Chart, line chart&#10;&#10;Description automatically generated">
             <a:extLst>
               <a:ext uri="{FF2B5EF4-FFF2-40B4-BE49-F238E27FC236}">
-                <a16:creationId xmlns:a16="http://schemas.microsoft.com/office/drawing/2014/main" id="{F578C108-86CB-47F7-B624-1EC12B4D1C09}"/>
+                <a16:creationId xmlns:a16="http://schemas.microsoft.com/office/drawing/2014/main" id="{17C38845-A40E-4EA1-B4CC-E5E57067A65C}"/>
               </a:ext>
             </a:extLst>
           </p:cNvPr>
@@ -8853,7 +9107,7 @@
       </p:pic>
       <p:sp>
         <p:nvSpPr>
-          <p:cNvPr id="16" name="Rounded Rectangle 16">
+          <p:cNvPr id="25" name="Rounded Rectangle 16">
             <a:extLst>
               <a:ext uri="{FF2B5EF4-FFF2-40B4-BE49-F238E27FC236}">
                 <a16:creationId xmlns:a16="http://schemas.microsoft.com/office/drawing/2014/main" id="{080B7D90-3DF1-4514-B26D-616BE35553C9}"/>
@@ -8927,10 +9181,10 @@
       </p:sp>
       <p:pic>
         <p:nvPicPr>
-          <p:cNvPr id="7" name="Picture 6" descr="Chart&#10;&#10;Description automatically generated">
+          <p:cNvPr id="10" name="Picture 9" descr="Chart&#10;&#10;Description automatically generated">
             <a:extLst>
               <a:ext uri="{FF2B5EF4-FFF2-40B4-BE49-F238E27FC236}">
-                <a16:creationId xmlns:a16="http://schemas.microsoft.com/office/drawing/2014/main" id="{B1DFD8A7-4E1E-4998-8DC9-403C7C2FC980}"/>
+                <a16:creationId xmlns:a16="http://schemas.microsoft.com/office/drawing/2014/main" id="{C504523E-28B8-4961-B183-0C5A187E74CA}"/>
               </a:ext>
             </a:extLst>
           </p:cNvPr>
@@ -9327,7 +9581,7 @@
       </p:grpSpPr>
       <p:sp>
         <p:nvSpPr>
-          <p:cNvPr id="10" name="Rectangle 9">
+          <p:cNvPr id="12" name="Rectangle 14">
             <a:extLst>
               <a:ext uri="{FF2B5EF4-FFF2-40B4-BE49-F238E27FC236}">
                 <a16:creationId xmlns:a16="http://schemas.microsoft.com/office/drawing/2014/main" id="{A4AC5506-6312-4701-8D3C-40187889A947}"/>
@@ -9426,17 +9680,17 @@
                 <a:ea typeface="+mj-ea"/>
                 <a:cs typeface="+mj-cs"/>
               </a:rPr>
-              <a:t>CAM Capacity vs Degree</a:t>
+              <a:t>CAM Capacity vs Degree (Iteration 1)</a:t>
             </a:r>
           </a:p>
         </p:txBody>
       </p:sp>
       <p:pic>
         <p:nvPicPr>
-          <p:cNvPr id="5" name="Content Placeholder 4" descr="Chart, line chart&#10;&#10;Description automatically generated">
+          <p:cNvPr id="7" name="Content Placeholder 6" descr="Chart, line chart&#10;&#10;Description automatically generated">
             <a:extLst>
               <a:ext uri="{FF2B5EF4-FFF2-40B4-BE49-F238E27FC236}">
-                <a16:creationId xmlns:a16="http://schemas.microsoft.com/office/drawing/2014/main" id="{DF6A0CCB-8311-4A18-879C-49B3D2845A23}"/>
+                <a16:creationId xmlns:a16="http://schemas.microsoft.com/office/drawing/2014/main" id="{5896545A-6956-4BD6-B8D4-89EC625CF3BF}"/>
               </a:ext>
             </a:extLst>
           </p:cNvPr>
@@ -9509,7 +9763,7 @@
       </p:grpSpPr>
       <p:sp>
         <p:nvSpPr>
-          <p:cNvPr id="10" name="Rectangle 9">
+          <p:cNvPr id="15" name="Rectangle 14">
             <a:extLst>
               <a:ext uri="{FF2B5EF4-FFF2-40B4-BE49-F238E27FC236}">
                 <a16:creationId xmlns:a16="http://schemas.microsoft.com/office/drawing/2014/main" id="{A4AC5506-6312-4701-8D3C-40187889A947}"/>
@@ -9615,10 +9869,10 @@
       </p:sp>
       <p:pic>
         <p:nvPicPr>
-          <p:cNvPr id="5" name="Content Placeholder 4" descr="Chart&#10;&#10;Description automatically generated">
+          <p:cNvPr id="7" name="Content Placeholder 6" descr="Chart&#10;&#10;Description automatically generated">
             <a:extLst>
               <a:ext uri="{FF2B5EF4-FFF2-40B4-BE49-F238E27FC236}">
-                <a16:creationId xmlns:a16="http://schemas.microsoft.com/office/drawing/2014/main" id="{5C893EAD-17AC-4FE5-95B6-4C25BD81D608}"/>
+                <a16:creationId xmlns:a16="http://schemas.microsoft.com/office/drawing/2014/main" id="{2F376F99-91F2-46AE-8C07-6720005AF3DD}"/>
               </a:ext>
             </a:extLst>
           </p:cNvPr>
@@ -9691,7 +9945,7 @@
       </p:grpSpPr>
       <p:sp>
         <p:nvSpPr>
-          <p:cNvPr id="10" name="Rectangle 9">
+          <p:cNvPr id="15" name="Rectangle 14">
             <a:extLst>
               <a:ext uri="{FF2B5EF4-FFF2-40B4-BE49-F238E27FC236}">
                 <a16:creationId xmlns:a16="http://schemas.microsoft.com/office/drawing/2014/main" id="{A4AC5506-6312-4701-8D3C-40187889A947}"/>
@@ -9782,7 +10036,7 @@
           <a:p>
             <a:pPr algn="ctr"/>
             <a:r>
-              <a:rPr lang="en-US" sz="3200" kern="1200">
+              <a:rPr lang="en-US" sz="3200" kern="1200" dirty="0">
                 <a:solidFill>
                   <a:schemeClr val="bg1"/>
                 </a:solidFill>
@@ -9790,17 +10044,17 @@
                 <a:ea typeface="+mj-ea"/>
                 <a:cs typeface="+mj-cs"/>
               </a:rPr>
-              <a:t>CAM Capacity vs Degree </a:t>
+              <a:t>CAM Capacity vs Degree (Iteration 1) </a:t>
             </a:r>
           </a:p>
         </p:txBody>
       </p:sp>
       <p:pic>
         <p:nvPicPr>
-          <p:cNvPr id="5" name="Content Placeholder 4" descr="Chart, line chart&#10;&#10;Description automatically generated">
+          <p:cNvPr id="7" name="Content Placeholder 6" descr="Chart, line chart&#10;&#10;Description automatically generated">
             <a:extLst>
               <a:ext uri="{FF2B5EF4-FFF2-40B4-BE49-F238E27FC236}">
-                <a16:creationId xmlns:a16="http://schemas.microsoft.com/office/drawing/2014/main" id="{B2E2FB7E-1C39-45B1-91FF-5E12B087DA1C}"/>
+                <a16:creationId xmlns:a16="http://schemas.microsoft.com/office/drawing/2014/main" id="{02DED625-AF17-4723-8901-F2820E352289}"/>
               </a:ext>
             </a:extLst>
           </p:cNvPr>
@@ -9979,10 +10233,10 @@
       </p:sp>
       <p:pic>
         <p:nvPicPr>
-          <p:cNvPr id="5" name="Content Placeholder 4" descr="Chart&#10;&#10;Description automatically generated">
+          <p:cNvPr id="7" name="Content Placeholder 6" descr="Chart&#10;&#10;Description automatically generated">
             <a:extLst>
               <a:ext uri="{FF2B5EF4-FFF2-40B4-BE49-F238E27FC236}">
-                <a16:creationId xmlns:a16="http://schemas.microsoft.com/office/drawing/2014/main" id="{8CB98548-80D1-40F1-B37F-4D435DB64A77}"/>
+                <a16:creationId xmlns:a16="http://schemas.microsoft.com/office/drawing/2014/main" id="{873113DE-297E-4FC0-935D-BC9C02C84142}"/>
               </a:ext>
             </a:extLst>
           </p:cNvPr>
@@ -10007,12 +10261,9 @@
         </p:blipFill>
         <p:spPr>
           <a:xfrm>
-            <a:off x="1470528" y="1675227"/>
-            <a:ext cx="9250943" cy="4394199"/>
+            <a:off x="1516703" y="1825625"/>
+            <a:ext cx="9158594" cy="4351338"/>
           </a:xfrm>
-          <a:prstGeom prst="rect">
-            <a:avLst/>
-          </a:prstGeom>
         </p:spPr>
       </p:pic>
     </p:spTree>
@@ -10055,7 +10306,7 @@
       </p:grpSpPr>
       <p:sp>
         <p:nvSpPr>
-          <p:cNvPr id="10" name="Rectangle 9">
+          <p:cNvPr id="15" name="Rectangle 14">
             <a:extLst>
               <a:ext uri="{FF2B5EF4-FFF2-40B4-BE49-F238E27FC236}">
                 <a16:creationId xmlns:a16="http://schemas.microsoft.com/office/drawing/2014/main" id="{A4AC5506-6312-4701-8D3C-40187889A947}"/>
@@ -10161,10 +10412,10 @@
       </p:sp>
       <p:pic>
         <p:nvPicPr>
-          <p:cNvPr id="5" name="Content Placeholder 4" descr="Chart, bar chart&#10;&#10;Description automatically generated">
+          <p:cNvPr id="7" name="Content Placeholder 6" descr="Chart, bar chart&#10;&#10;Description automatically generated">
             <a:extLst>
               <a:ext uri="{FF2B5EF4-FFF2-40B4-BE49-F238E27FC236}">
-                <a16:creationId xmlns:a16="http://schemas.microsoft.com/office/drawing/2014/main" id="{AC3C2712-638A-40E4-94A2-C7CCFEB7D2DD}"/>
+                <a16:creationId xmlns:a16="http://schemas.microsoft.com/office/drawing/2014/main" id="{A18F6B37-55F9-4195-92B8-3A38E2E58478}"/>
               </a:ext>
             </a:extLst>
           </p:cNvPr>
@@ -10343,10 +10594,10 @@
       </p:sp>
       <p:pic>
         <p:nvPicPr>
-          <p:cNvPr id="5" name="Content Placeholder 4" descr="Chart, bar chart&#10;&#10;Description automatically generated">
+          <p:cNvPr id="7" name="Content Placeholder 6" descr="Chart, bar chart&#10;&#10;Description automatically generated">
             <a:extLst>
               <a:ext uri="{FF2B5EF4-FFF2-40B4-BE49-F238E27FC236}">
-                <a16:creationId xmlns:a16="http://schemas.microsoft.com/office/drawing/2014/main" id="{119C3688-FB87-498B-8E6A-C827F11F9E12}"/>
+                <a16:creationId xmlns:a16="http://schemas.microsoft.com/office/drawing/2014/main" id="{E2A7591E-7319-4C3A-A37B-364C4E058532}"/>
               </a:ext>
             </a:extLst>
           </p:cNvPr>
@@ -10371,12 +10622,9 @@
         </p:blipFill>
         <p:spPr>
           <a:xfrm>
-            <a:off x="1470528" y="1675227"/>
-            <a:ext cx="9250943" cy="4394199"/>
+            <a:off x="1516703" y="1825625"/>
+            <a:ext cx="9158594" cy="4351338"/>
           </a:xfrm>
-          <a:prstGeom prst="rect">
-            <a:avLst/>
-          </a:prstGeom>
         </p:spPr>
       </p:pic>
     </p:spTree>
@@ -10419,7 +10667,7 @@
       </p:grpSpPr>
       <p:sp>
         <p:nvSpPr>
-          <p:cNvPr id="10" name="Rectangle 9">
+          <p:cNvPr id="15" name="Rectangle 14">
             <a:extLst>
               <a:ext uri="{FF2B5EF4-FFF2-40B4-BE49-F238E27FC236}">
                 <a16:creationId xmlns:a16="http://schemas.microsoft.com/office/drawing/2014/main" id="{A4AC5506-6312-4701-8D3C-40187889A947}"/>
@@ -10525,10 +10773,10 @@
       </p:sp>
       <p:pic>
         <p:nvPicPr>
-          <p:cNvPr id="5" name="Content Placeholder 4" descr="Chart, bar chart&#10;&#10;Description automatically generated">
+          <p:cNvPr id="7" name="Content Placeholder 6" descr="Chart, bar chart&#10;&#10;Description automatically generated">
             <a:extLst>
               <a:ext uri="{FF2B5EF4-FFF2-40B4-BE49-F238E27FC236}">
-                <a16:creationId xmlns:a16="http://schemas.microsoft.com/office/drawing/2014/main" id="{086713DA-177E-4B6A-B29D-E8E6E48D4139}"/>
+                <a16:creationId xmlns:a16="http://schemas.microsoft.com/office/drawing/2014/main" id="{2567BE3E-7A3B-406D-A6CB-B1C4AB749FEB}"/>
               </a:ext>
             </a:extLst>
           </p:cNvPr>

</xml_diff>